<commit_message>
updated urls and pptx
</commit_message>
<xml_diff>
--- a/JeAnnaAbbott_JameyJohnston_Reproducible Research-Best Practices and Tools for Support_AOM_20180419.pptx
+++ b/JeAnnaAbbott_JameyJohnston_Reproducible Research-Best Practices and Tools for Support_AOM_20180419.pptx
@@ -158,7 +158,7 @@
 <p1510:revInfo xmlns:a="http://schemas.openxmlformats.org/drawingml/2006/main" xmlns:r="http://schemas.openxmlformats.org/officeDocument/2006/relationships" xmlns:p1510="http://schemas.microsoft.com/office/powerpoint/2015/10/main">
   <p1510:revLst>
     <p1510:client id="{213E1A3C-CC60-463F-BA3A-8A3CD6D789A4}" v="70" dt="2018-04-17T20:52:32.749"/>
-    <p1510:client id="{ADF3A6EF-BFE5-44C7-BB4D-F59037ED3625}" v="1138" dt="2018-04-18T10:16:16.951"/>
+    <p1510:client id="{ADF3A6EF-BFE5-44C7-BB4D-F59037ED3625}" v="1143" dt="2018-04-18T14:48:52.886"/>
   </p1510:revLst>
 </p1510:revInfo>
 </file>
@@ -531,7 +531,7 @@
   <pc:docChgLst>
     <pc:chgData name="Jamey Johnston" userId="4930901e9435c751" providerId="LiveId" clId="{ADF3A6EF-BFE5-44C7-BB4D-F59037ED3625}"/>
     <pc:docChg chg="undo custSel addSld delSld modSld">
-      <pc:chgData name="Jamey Johnston" userId="4930901e9435c751" providerId="LiveId" clId="{ADF3A6EF-BFE5-44C7-BB4D-F59037ED3625}" dt="2018-04-18T10:16:16.951" v="1130" actId="1076"/>
+      <pc:chgData name="Jamey Johnston" userId="4930901e9435c751" providerId="LiveId" clId="{ADF3A6EF-BFE5-44C7-BB4D-F59037ED3625}" dt="2018-04-18T14:48:52.872" v="1134" actId="20577"/>
       <pc:docMkLst>
         <pc:docMk/>
       </pc:docMkLst>
@@ -1045,6 +1045,21 @@
           <pc:docMk/>
           <pc:sldMk cId="793710768" sldId="382"/>
         </pc:sldMkLst>
+      </pc:sldChg>
+      <pc:sldChg chg="modSp">
+        <pc:chgData name="Jamey Johnston" userId="4930901e9435c751" providerId="LiveId" clId="{ADF3A6EF-BFE5-44C7-BB4D-F59037ED3625}" dt="2018-04-18T14:48:52.872" v="1134" actId="20577"/>
+        <pc:sldMkLst>
+          <pc:docMk/>
+          <pc:sldMk cId="945323540" sldId="383"/>
+        </pc:sldMkLst>
+        <pc:spChg chg="mod">
+          <ac:chgData name="Jamey Johnston" userId="4930901e9435c751" providerId="LiveId" clId="{ADF3A6EF-BFE5-44C7-BB4D-F59037ED3625}" dt="2018-04-18T14:48:52.872" v="1134" actId="20577"/>
+          <ac:spMkLst>
+            <pc:docMk/>
+            <pc:sldMk cId="945323540" sldId="383"/>
+            <ac:spMk id="25" creationId="{0277C7EA-5134-4ADD-90D1-1111B90D7EBA}"/>
+          </ac:spMkLst>
+        </pc:spChg>
       </pc:sldChg>
       <pc:sldChg chg="modSp add">
         <pc:chgData name="Jamey Johnston" userId="4930901e9435c751" providerId="LiveId" clId="{ADF3A6EF-BFE5-44C7-BB4D-F59037ED3625}" dt="2018-04-18T08:57:27.612" v="547" actId="20577"/>
@@ -15097,16 +15112,14 @@
                 <a:cs typeface="Segoe UI"/>
                 <a:hlinkClick r:id="rId5"/>
               </a:rPr>
-              <a:t>https://github.com/STATCowboy/SnakeCharmer-Intro</a:t>
-            </a:r>
-            <a:endParaRPr lang="en-US" sz="800" dirty="0">
-              <a:cs typeface="Segoe UI"/>
-            </a:endParaRPr>
-          </a:p>
-          <a:p>
-            <a:endParaRPr lang="en-US" sz="800" dirty="0">
-              <a:cs typeface="Segoe UI"/>
-            </a:endParaRPr>
+              <a:t>https://github.com/STATCowboy/Reproducible-Research</a:t>
+            </a:r>
+            <a:r>
+              <a:rPr lang="en-US" sz="800" dirty="0">
+                <a:cs typeface="Segoe UI"/>
+              </a:rPr>
+              <a:t> </a:t>
+            </a:r>
           </a:p>
         </p:txBody>
       </p:sp>

</xml_diff>